<commit_message>
minor update to folder structure
</commit_message>
<xml_diff>
--- a/presentations/Feb 22th, 2024/New Microsoft PowerPoint Presentation.pptx
+++ b/presentations/Feb 22th, 2024/New Microsoft PowerPoint Presentation.pptx
@@ -13,6 +13,7 @@
     <p:sldId id="261" r:id="rId7"/>
     <p:sldId id="262" r:id="rId8"/>
     <p:sldId id="263" r:id="rId9"/>
+    <p:sldId id="264" r:id="rId10"/>
   </p:sldIdLst>
   <p:sldSz cx="12192000" cy="6858000"/>
   <p:notesSz cx="6858000" cy="9144000"/>
@@ -111,6 +112,11 @@
       </a:defRPr>
     </a:lvl9pPr>
   </p:defaultTextStyle>
+  <p:extLst>
+    <p:ext uri="{EFAFB233-063F-42B5-8137-9DF3F51BA10A}">
+      <p15:sldGuideLst xmlns:p15="http://schemas.microsoft.com/office/powerpoint/2012/main"/>
+    </p:ext>
+  </p:extLst>
 </p:presentation>
 </file>
 
@@ -263,7 +269,7 @@
           <a:p>
             <a:fld id="{E530F5AE-1D6B-4F6F-87BA-E51A5E8450FB}" type="datetimeFigureOut">
               <a:rPr lang="en-CA" smtClean="0"/>
-              <a:t>2024-02-20</a:t>
+              <a:t>2024-02-22</a:t>
             </a:fld>
             <a:endParaRPr lang="en-CA"/>
           </a:p>
@@ -463,7 +469,7 @@
           <a:p>
             <a:fld id="{E530F5AE-1D6B-4F6F-87BA-E51A5E8450FB}" type="datetimeFigureOut">
               <a:rPr lang="en-CA" smtClean="0"/>
-              <a:t>2024-02-20</a:t>
+              <a:t>2024-02-22</a:t>
             </a:fld>
             <a:endParaRPr lang="en-CA"/>
           </a:p>
@@ -673,7 +679,7 @@
           <a:p>
             <a:fld id="{E530F5AE-1D6B-4F6F-87BA-E51A5E8450FB}" type="datetimeFigureOut">
               <a:rPr lang="en-CA" smtClean="0"/>
-              <a:t>2024-02-20</a:t>
+              <a:t>2024-02-22</a:t>
             </a:fld>
             <a:endParaRPr lang="en-CA"/>
           </a:p>
@@ -873,7 +879,7 @@
           <a:p>
             <a:fld id="{E530F5AE-1D6B-4F6F-87BA-E51A5E8450FB}" type="datetimeFigureOut">
               <a:rPr lang="en-CA" smtClean="0"/>
-              <a:t>2024-02-20</a:t>
+              <a:t>2024-02-22</a:t>
             </a:fld>
             <a:endParaRPr lang="en-CA"/>
           </a:p>
@@ -1149,7 +1155,7 @@
           <a:p>
             <a:fld id="{E530F5AE-1D6B-4F6F-87BA-E51A5E8450FB}" type="datetimeFigureOut">
               <a:rPr lang="en-CA" smtClean="0"/>
-              <a:t>2024-02-20</a:t>
+              <a:t>2024-02-22</a:t>
             </a:fld>
             <a:endParaRPr lang="en-CA"/>
           </a:p>
@@ -1417,7 +1423,7 @@
           <a:p>
             <a:fld id="{E530F5AE-1D6B-4F6F-87BA-E51A5E8450FB}" type="datetimeFigureOut">
               <a:rPr lang="en-CA" smtClean="0"/>
-              <a:t>2024-02-20</a:t>
+              <a:t>2024-02-22</a:t>
             </a:fld>
             <a:endParaRPr lang="en-CA"/>
           </a:p>
@@ -1832,7 +1838,7 @@
           <a:p>
             <a:fld id="{E530F5AE-1D6B-4F6F-87BA-E51A5E8450FB}" type="datetimeFigureOut">
               <a:rPr lang="en-CA" smtClean="0"/>
-              <a:t>2024-02-20</a:t>
+              <a:t>2024-02-22</a:t>
             </a:fld>
             <a:endParaRPr lang="en-CA"/>
           </a:p>
@@ -1974,7 +1980,7 @@
           <a:p>
             <a:fld id="{E530F5AE-1D6B-4F6F-87BA-E51A5E8450FB}" type="datetimeFigureOut">
               <a:rPr lang="en-CA" smtClean="0"/>
-              <a:t>2024-02-20</a:t>
+              <a:t>2024-02-22</a:t>
             </a:fld>
             <a:endParaRPr lang="en-CA"/>
           </a:p>
@@ -2087,7 +2093,7 @@
           <a:p>
             <a:fld id="{E530F5AE-1D6B-4F6F-87BA-E51A5E8450FB}" type="datetimeFigureOut">
               <a:rPr lang="en-CA" smtClean="0"/>
-              <a:t>2024-02-20</a:t>
+              <a:t>2024-02-22</a:t>
             </a:fld>
             <a:endParaRPr lang="en-CA"/>
           </a:p>
@@ -2400,7 +2406,7 @@
           <a:p>
             <a:fld id="{E530F5AE-1D6B-4F6F-87BA-E51A5E8450FB}" type="datetimeFigureOut">
               <a:rPr lang="en-CA" smtClean="0"/>
-              <a:t>2024-02-20</a:t>
+              <a:t>2024-02-22</a:t>
             </a:fld>
             <a:endParaRPr lang="en-CA"/>
           </a:p>
@@ -2689,7 +2695,7 @@
           <a:p>
             <a:fld id="{E530F5AE-1D6B-4F6F-87BA-E51A5E8450FB}" type="datetimeFigureOut">
               <a:rPr lang="en-CA" smtClean="0"/>
-              <a:t>2024-02-20</a:t>
+              <a:t>2024-02-22</a:t>
             </a:fld>
             <a:endParaRPr lang="en-CA"/>
           </a:p>
@@ -2932,7 +2938,7 @@
           <a:p>
             <a:fld id="{E530F5AE-1D6B-4F6F-87BA-E51A5E8450FB}" type="datetimeFigureOut">
               <a:rPr lang="en-CA" smtClean="0"/>
-              <a:t>2024-02-20</a:t>
+              <a:t>2024-02-22</a:t>
             </a:fld>
             <a:endParaRPr lang="en-CA"/>
           </a:p>
@@ -8067,6 +8073,116 @@
 </p:sld>
 </file>
 
+<file path=ppt/slides/slide9.xml><?xml version="1.0" encoding="utf-8"?>
+<p:sld xmlns:a="http://schemas.openxmlformats.org/drawingml/2006/main" xmlns:r="http://schemas.openxmlformats.org/officeDocument/2006/relationships" xmlns:p="http://schemas.openxmlformats.org/presentationml/2006/main">
+  <p:cSld>
+    <p:spTree>
+      <p:nvGrpSpPr>
+        <p:cNvPr id="1" name=""/>
+        <p:cNvGrpSpPr/>
+        <p:nvPr/>
+      </p:nvGrpSpPr>
+      <p:grpSpPr>
+        <a:xfrm>
+          <a:off x="0" y="0"/>
+          <a:ext cx="0" cy="0"/>
+          <a:chOff x="0" y="0"/>
+          <a:chExt cx="0" cy="0"/>
+        </a:xfrm>
+      </p:grpSpPr>
+      <p:sp>
+        <p:nvSpPr>
+          <p:cNvPr id="2" name="Title 1">
+            <a:extLst>
+              <a:ext uri="{FF2B5EF4-FFF2-40B4-BE49-F238E27FC236}">
+                <a16:creationId xmlns:a16="http://schemas.microsoft.com/office/drawing/2014/main" id="{1F2218CC-ACBD-31EC-1B1C-1ADB1A95C77D}"/>
+              </a:ext>
+            </a:extLst>
+          </p:cNvPr>
+          <p:cNvSpPr>
+            <a:spLocks noGrp="1"/>
+          </p:cNvSpPr>
+          <p:nvPr>
+            <p:ph type="title"/>
+          </p:nvPr>
+        </p:nvSpPr>
+        <p:spPr/>
+        <p:txBody>
+          <a:bodyPr/>
+          <a:lstStyle/>
+          <a:p>
+            <a:endParaRPr lang="en-CA"/>
+          </a:p>
+        </p:txBody>
+      </p:sp>
+      <p:sp>
+        <p:nvSpPr>
+          <p:cNvPr id="3" name="Content Placeholder 2">
+            <a:extLst>
+              <a:ext uri="{FF2B5EF4-FFF2-40B4-BE49-F238E27FC236}">
+                <a16:creationId xmlns:a16="http://schemas.microsoft.com/office/drawing/2014/main" id="{060BA96D-2020-9229-CD95-4F7557CA7E76}"/>
+              </a:ext>
+            </a:extLst>
+          </p:cNvPr>
+          <p:cNvSpPr>
+            <a:spLocks noGrp="1"/>
+          </p:cNvSpPr>
+          <p:nvPr>
+            <p:ph idx="1"/>
+          </p:nvPr>
+        </p:nvSpPr>
+        <p:spPr/>
+        <p:txBody>
+          <a:bodyPr/>
+          <a:lstStyle/>
+          <a:p>
+            <a:endParaRPr lang="en-CA"/>
+          </a:p>
+        </p:txBody>
+      </p:sp>
+      <p:pic>
+        <p:nvPicPr>
+          <p:cNvPr id="5" name="Picture 4">
+            <a:extLst>
+              <a:ext uri="{FF2B5EF4-FFF2-40B4-BE49-F238E27FC236}">
+                <a16:creationId xmlns:a16="http://schemas.microsoft.com/office/drawing/2014/main" id="{BF9A1F0B-E30A-AE1F-2797-EBA05FB17A1F}"/>
+              </a:ext>
+            </a:extLst>
+          </p:cNvPr>
+          <p:cNvPicPr>
+            <a:picLocks noChangeAspect="1"/>
+          </p:cNvPicPr>
+          <p:nvPr/>
+        </p:nvPicPr>
+        <p:blipFill>
+          <a:blip r:embed="rId2"/>
+          <a:stretch>
+            <a:fillRect/>
+          </a:stretch>
+        </p:blipFill>
+        <p:spPr>
+          <a:xfrm>
+            <a:off x="5810969" y="2519577"/>
+            <a:ext cx="5925130" cy="3792323"/>
+          </a:xfrm>
+          <a:prstGeom prst="rect">
+            <a:avLst/>
+          </a:prstGeom>
+        </p:spPr>
+      </p:pic>
+    </p:spTree>
+    <p:extLst>
+      <p:ext uri="{BB962C8B-B14F-4D97-AF65-F5344CB8AC3E}">
+        <p14:creationId xmlns:p14="http://schemas.microsoft.com/office/powerpoint/2010/main" val="4228002626"/>
+      </p:ext>
+    </p:extLst>
+  </p:cSld>
+  <p:clrMapOvr>
+    <a:masterClrMapping/>
+  </p:clrMapOvr>
+</p:sld>
+</file>
+
 <file path=ppt/theme/theme1.xml><?xml version="1.0" encoding="utf-8"?>
 <a:theme xmlns:a="http://schemas.openxmlformats.org/drawingml/2006/main" name="Office Theme">
   <a:themeElements>

</xml_diff>